<commit_message>
Diagram updated, code removed from submission folder
</commit_message>
<xml_diff>
--- a/Processor_Sim_Project/Additional Files/ScalarSimSlides.pptx
+++ b/Processor_Sim_Project/Additional Files/ScalarSimSlides.pptx
@@ -106,6 +106,11 @@
       </a:defRPr>
     </a:lvl9pPr>
   </p:defaultTextStyle>
+  <p:extLst>
+    <p:ext uri="{EFAFB233-063F-42B5-8137-9DF3F51BA10A}">
+      <p15:sldGuideLst xmlns:p15="http://schemas.microsoft.com/office/powerpoint/2012/main"/>
+    </p:ext>
+  </p:extLst>
 </p:presentation>
 </file>
 
@@ -3374,10 +3379,10 @@
       </p:sp>
       <p:pic>
         <p:nvPicPr>
-          <p:cNvPr id="5" name="Picture 4" descr="Diagram, schematic&#10;&#10;Description automatically generated">
-            <a:extLst>
-              <a:ext uri="{FF2B5EF4-FFF2-40B4-BE49-F238E27FC236}">
-                <a16:creationId xmlns:a16="http://schemas.microsoft.com/office/drawing/2014/main" id="{A0FC74AF-5FA7-45C9-B1F7-357EC826EEFD}"/>
+          <p:cNvPr id="4" name="Picture 3" descr="Diagram, schematic&#10;&#10;Description automatically generated">
+            <a:extLst>
+              <a:ext uri="{FF2B5EF4-FFF2-40B4-BE49-F238E27FC236}">
+                <a16:creationId xmlns:a16="http://schemas.microsoft.com/office/drawing/2014/main" id="{9EB42160-D692-49C6-B2A1-315339E6B94A}"/>
               </a:ext>
             </a:extLst>
           </p:cNvPr>
@@ -3400,8 +3405,8 @@
         </p:blipFill>
         <p:spPr>
           <a:xfrm>
-            <a:off x="917133" y="1810139"/>
-            <a:ext cx="9598467" cy="4368282"/>
+            <a:off x="901959" y="1738902"/>
+            <a:ext cx="10388082" cy="4602402"/>
           </a:xfrm>
           <a:prstGeom prst="rect">
             <a:avLst/>

</xml_diff>